<commit_message>
Update documents for version 10.2.3
KhiopsVisualizationGuide: referencement de la derniere version de l'outil 11.0.9, livré avec la 10.2.3
KhiopsCovisualizationGuide: referencement la derniere version de l'outil 11.1.2 livré avec la 10.2.3
Mise à jour de toutes les dates à novembre 2024
Regeneration de tous les pdf, a destination d'un espace release
</commit_message>
<xml_diff>
--- a/KhiopsScenarios.pptx
+++ b/KhiopsScenarios.pptx
@@ -298,7 +298,7 @@
               <a:pPr>
                 <a:defRPr/>
               </a:pPr>
-              <a:t>09/04/2024</a:t>
+              <a:t>05/11/2024</a:t>
             </a:fld>
             <a:endParaRPr lang="fr-FR"/>
           </a:p>
@@ -514,7 +514,7 @@
               <a:pPr>
                 <a:defRPr/>
               </a:pPr>
-              <a:t>09/04/2024</a:t>
+              <a:t>05/11/2024</a:t>
             </a:fld>
             <a:endParaRPr lang="fr-FR"/>
           </a:p>
@@ -1130,7 +1130,7 @@
               <a:pPr>
                 <a:defRPr/>
               </a:pPr>
-              <a:t>09/04/2024</a:t>
+              <a:t>05/11/2024</a:t>
             </a:fld>
             <a:endParaRPr lang="en-US"/>
           </a:p>
@@ -1336,7 +1336,7 @@
               <a:pPr>
                 <a:defRPr/>
               </a:pPr>
-              <a:t>09/04/2024</a:t>
+              <a:t>05/11/2024</a:t>
             </a:fld>
             <a:endParaRPr lang="fr-FR"/>
           </a:p>
@@ -1531,7 +1531,7 @@
               <a:pPr>
                 <a:defRPr/>
               </a:pPr>
-              <a:t>09/04/2024</a:t>
+              <a:t>05/11/2024</a:t>
             </a:fld>
             <a:endParaRPr lang="fr-FR"/>
           </a:p>
@@ -1809,7 +1809,7 @@
               <a:pPr>
                 <a:defRPr/>
               </a:pPr>
-              <a:t>09/04/2024</a:t>
+              <a:t>05/11/2024</a:t>
             </a:fld>
             <a:endParaRPr lang="fr-FR"/>
           </a:p>
@@ -2235,7 +2235,7 @@
               <a:pPr>
                 <a:defRPr/>
               </a:pPr>
-              <a:t>09/04/2024</a:t>
+              <a:t>05/11/2024</a:t>
             </a:fld>
             <a:endParaRPr lang="fr-FR"/>
           </a:p>
@@ -2493,7 +2493,7 @@
               <a:pPr>
                 <a:defRPr/>
               </a:pPr>
-              <a:t>09/04/2024</a:t>
+              <a:t>05/11/2024</a:t>
             </a:fld>
             <a:endParaRPr lang="fr-FR"/>
           </a:p>
@@ -2744,7 +2744,7 @@
               <a:pPr>
                 <a:defRPr/>
               </a:pPr>
-              <a:t>09/04/2024</a:t>
+              <a:t>05/11/2024</a:t>
             </a:fld>
             <a:endParaRPr lang="fr-FR"/>
           </a:p>
@@ -2954,7 +2954,7 @@
               <a:pPr>
                 <a:defRPr/>
               </a:pPr>
-              <a:t>09/04/2024</a:t>
+              <a:t>05/11/2024</a:t>
             </a:fld>
             <a:endParaRPr lang="fr-FR"/>
           </a:p>
@@ -3067,7 +3067,7 @@
               <a:pPr>
                 <a:defRPr/>
               </a:pPr>
-              <a:t>09/04/2024</a:t>
+              <a:t>05/11/2024</a:t>
             </a:fld>
             <a:endParaRPr lang="fr-FR"/>
           </a:p>
@@ -3218,7 +3218,7 @@
               <a:pPr>
                 <a:defRPr/>
               </a:pPr>
-              <a:t>09/04/2024</a:t>
+              <a:t>05/11/2024</a:t>
             </a:fld>
             <a:endParaRPr lang="fr-FR"/>
           </a:p>
@@ -3746,7 +3746,7 @@
               <a:pPr>
                 <a:defRPr/>
               </a:pPr>
-              <a:t>09/04/2024</a:t>
+              <a:t>05/11/2024</a:t>
             </a:fld>
             <a:endParaRPr lang="fr-FR"/>
           </a:p>
@@ -4022,7 +4022,7 @@
               <a:pPr>
                 <a:defRPr/>
               </a:pPr>
-              <a:t>09/04/2024</a:t>
+              <a:t>05/11/2024</a:t>
             </a:fld>
             <a:endParaRPr lang="fr-FR"/>
           </a:p>
@@ -4252,6 +4252,52 @@
               <a:t>‹N°›</a:t>
             </a:fld>
             <a:endParaRPr lang="fr-FR"/>
+          </a:p>
+        </p:txBody>
+      </p:sp>
+      <p:sp>
+        <p:nvSpPr>
+          <p:cNvPr id="4" name="ZoneTexte 3">
+            <a:extLst>
+              <a:ext uri="{FF2B5EF4-FFF2-40B4-BE49-F238E27FC236}">
+                <a16:creationId xmlns:a16="http://schemas.microsoft.com/office/drawing/2014/main" id="{A194D815-F17D-73CF-2ACE-26A9E8069CA5}"/>
+              </a:ext>
+            </a:extLst>
+          </p:cNvPr>
+          <p:cNvSpPr txBox="1"/>
+          <p:nvPr userDrawn="1">
+            <p:extLst>
+              <p:ext uri="{1162E1C5-73C7-4A58-AE30-91384D911F3F}">
+                <p184:classification xmlns:p184="http://schemas.microsoft.com/office/powerpoint/2018/4/main" val="ftr"/>
+              </p:ext>
+            </p:extLst>
+          </p:nvPr>
+        </p:nvSpPr>
+        <p:spPr>
+          <a:xfrm>
+            <a:off x="4125913" y="6672580"/>
+            <a:ext cx="920750" cy="121920"/>
+          </a:xfrm>
+          <a:prstGeom prst="rect">
+            <a:avLst/>
+          </a:prstGeom>
+        </p:spPr>
+        <p:txBody>
+          <a:bodyPr horzOverflow="overflow" lIns="0" tIns="0" rIns="0" bIns="0">
+            <a:spAutoFit/>
+          </a:bodyPr>
+          <a:lstStyle/>
+          <a:p>
+            <a:pPr algn="l"/>
+            <a:r>
+              <a:rPr lang="fr-FR" sz="800">
+                <a:solidFill>
+                  <a:srgbClr val="ED7D31"/>
+                </a:solidFill>
+                <a:latin typeface="Helvetica 75 Bold" panose="020B0804020202020204" pitchFamily="34" charset="0"/>
+              </a:rPr>
+              <a:t>Orange Restricted</a:t>
+            </a:r>
           </a:p>
         </p:txBody>
       </p:sp>
@@ -4704,6 +4750,17 @@
           </a:p>
           <a:p>
             <a:r>
+              <a:rPr lang="en-US" sz="1800">
+                <a:solidFill>
+                  <a:schemeClr val="tx1">
+                    <a:lumMod val="75000"/>
+                    <a:lumOff val="25000"/>
+                  </a:schemeClr>
+                </a:solidFill>
+              </a:rPr>
+              <a:t>November </a:t>
+            </a:r>
+            <a:r>
               <a:rPr lang="en-US" sz="1800" dirty="0">
                 <a:solidFill>
                   <a:schemeClr val="tx1">
@@ -4712,7 +4769,7 @@
                   </a:schemeClr>
                 </a:solidFill>
               </a:rPr>
-              <a:t>April 2024</a:t>
+              <a:t>2024</a:t>
             </a:r>
             <a:endParaRPr lang="fr-FR" sz="1800" dirty="0">
               <a:solidFill>
@@ -11277,4 +11334,10 @@
   </a:objectDefaults>
   <a:extraClrSchemeLst/>
 </a:theme>
+</file>
+
+<file path=docMetadata/LabelInfo.xml><?xml version="1.0" encoding="utf-8"?>
+<clbl:labelList xmlns:clbl="http://schemas.microsoft.com/office/2020/mipLabelMetadata">
+  <clbl:label id="{e6c818a6-e1a0-4a6e-a969-20d857c5dc62}" enabled="1" method="Standard" siteId="{90c7a20a-f34b-40bf-bc48-b9253b6f5d20}" contentBits="2" removed="0"/>
+</clbl:labelList>
 </file>
</xml_diff>